<commit_message>
lil pres and rpz fix
</commit_message>
<xml_diff>
--- a/RPZ/Pres.pptx
+++ b/RPZ/Pres.pptx
@@ -22,7 +22,6 @@
     <p:sldId id="270" r:id="rId16"/>
     <p:sldId id="271" r:id="rId17"/>
     <p:sldId id="272" r:id="rId18"/>
-    <p:sldId id="273" r:id="rId19"/>
   </p:sldIdLst>
   <p:sldSz cx="12192000" cy="6858000"/>
   <p:notesSz cx="6858000" cy="9144000"/>
@@ -121,6 +120,11 @@
       </a:defRPr>
     </a:lvl9pPr>
   </p:defaultTextStyle>
+  <p:extLst>
+    <p:ext uri="{EFAFB233-063F-42B5-8137-9DF3F51BA10A}">
+      <p15:sldGuideLst xmlns:p15="http://schemas.microsoft.com/office/powerpoint/2012/main"/>
+    </p:ext>
+  </p:extLst>
 </p:presentation>
 </file>
 
@@ -4466,70 +4470,6 @@
 </p:sld>
 </file>
 
-<file path=ppt/slides/slide18.xml><?xml version="1.0" encoding="utf-8"?>
-<p:sld xmlns:a="http://schemas.openxmlformats.org/drawingml/2006/main" xmlns:r="http://schemas.openxmlformats.org/officeDocument/2006/relationships" xmlns:p="http://schemas.openxmlformats.org/presentationml/2006/main">
-  <p:cSld>
-    <p:spTree>
-      <p:nvGrpSpPr>
-        <p:cNvPr id="1" name=""/>
-        <p:cNvGrpSpPr/>
-        <p:nvPr/>
-      </p:nvGrpSpPr>
-      <p:grpSpPr>
-        <a:xfrm>
-          <a:off x="0" y="0"/>
-          <a:ext cx="0" cy="0"/>
-          <a:chOff x="0" y="0"/>
-          <a:chExt cx="0" cy="0"/>
-        </a:xfrm>
-      </p:grpSpPr>
-      <p:sp>
-        <p:nvSpPr>
-          <p:cNvPr id="2" name="Заголовок 1">
-            <a:extLst>
-              <a:ext uri="{FF2B5EF4-FFF2-40B4-BE49-F238E27FC236}">
-                <a16:creationId xmlns:a16="http://schemas.microsoft.com/office/drawing/2014/main" id="{BBDABCAE-0FAA-4105-9C6E-3E5934F596A9}"/>
-              </a:ext>
-            </a:extLst>
-          </p:cNvPr>
-          <p:cNvSpPr>
-            <a:spLocks noGrp="1"/>
-          </p:cNvSpPr>
-          <p:nvPr>
-            <p:ph type="title"/>
-          </p:nvPr>
-        </p:nvSpPr>
-        <p:spPr>
-          <a:xfrm>
-            <a:off x="838200" y="365125"/>
-            <a:ext cx="10515600" cy="5664972"/>
-          </a:xfrm>
-        </p:spPr>
-        <p:txBody>
-          <a:bodyPr/>
-          <a:lstStyle/>
-          <a:p>
-            <a:pPr algn="ctr"/>
-            <a:r>
-              <a:rPr lang="ru-RU" dirty="0"/>
-              <a:t>Спасибо за внимание</a:t>
-            </a:r>
-          </a:p>
-        </p:txBody>
-      </p:sp>
-    </p:spTree>
-    <p:extLst>
-      <p:ext uri="{BB962C8B-B14F-4D97-AF65-F5344CB8AC3E}">
-        <p14:creationId xmlns:p14="http://schemas.microsoft.com/office/powerpoint/2010/main" val="439848521"/>
-      </p:ext>
-    </p:extLst>
-  </p:cSld>
-  <p:clrMapOvr>
-    <a:masterClrMapping/>
-  </p:clrMapOvr>
-</p:sld>
-</file>
-
 <file path=ppt/slides/slide2.xml><?xml version="1.0" encoding="utf-8"?>
 <p:sld xmlns:a="http://schemas.openxmlformats.org/drawingml/2006/main" xmlns:r="http://schemas.openxmlformats.org/officeDocument/2006/relationships" xmlns:p="http://schemas.openxmlformats.org/presentationml/2006/main">
   <p:cSld>

</xml_diff>